<commit_message>
Datacode for mastTrait and mastGrowth
</commit_message>
<xml_diff>
--- a/recruit/JoinTempEcoLab2025_v1.pptx
+++ b/recruit/JoinTempEcoLab2025_v1.pptx
@@ -2146,7 +2146,7 @@
           </a:ln>
           <a:extLst>
             <a:ext uri="{C572A759-6A51-4108-AA02-DFA0A04FC94B}">
-              <ma14:wrappingTextBoxFlag xmlns="" xmlns:m="http://schemas.openxmlformats.org/officeDocument/2006/math" xmlns:a14="http://schemas.microsoft.com/office/drawing/2010/main" xmlns:ma14="http://schemas.microsoft.com/office/mac/drawingml/2011/main" val="1"/>
+              <ma14:wrappingTextBoxFlag xmlns:ma14="http://schemas.microsoft.com/office/mac/drawingml/2011/main" xmlns:a14="http://schemas.microsoft.com/office/drawing/2010/main" xmlns:m="http://schemas.openxmlformats.org/officeDocument/2006/math" xmlns="" val="1"/>
             </a:ext>
           </a:extLst>
         </p:spPr>
@@ -2185,7 +2185,7 @@
           </a:ln>
           <a:extLst>
             <a:ext uri="{C572A759-6A51-4108-AA02-DFA0A04FC94B}">
-              <ma14:wrappingTextBoxFlag xmlns="" xmlns:m="http://schemas.openxmlformats.org/officeDocument/2006/math" xmlns:a14="http://schemas.microsoft.com/office/drawing/2010/main" xmlns:ma14="http://schemas.microsoft.com/office/mac/drawingml/2011/main" val="1"/>
+              <ma14:wrappingTextBoxFlag xmlns:ma14="http://schemas.microsoft.com/office/mac/drawingml/2011/main" xmlns:a14="http://schemas.microsoft.com/office/drawing/2010/main" xmlns:m="http://schemas.openxmlformats.org/officeDocument/2006/math" xmlns="" val="1"/>
             </a:ext>
           </a:extLst>
         </p:spPr>
@@ -3219,7 +3219,7 @@
           </a:ln>
           <a:extLst>
             <a:ext uri="{C572A759-6A51-4108-AA02-DFA0A04FC94B}">
-              <ma14:wrappingTextBoxFlag xmlns="" xmlns:m="http://schemas.openxmlformats.org/officeDocument/2006/math" xmlns:a14="http://schemas.microsoft.com/office/drawing/2010/main" xmlns:ma14="http://schemas.microsoft.com/office/mac/drawingml/2011/main" val="1"/>
+              <ma14:wrappingTextBoxFlag xmlns:ma14="http://schemas.microsoft.com/office/mac/drawingml/2011/main" xmlns:a14="http://schemas.microsoft.com/office/drawing/2010/main" xmlns:m="http://schemas.openxmlformats.org/officeDocument/2006/math" xmlns="" val="1"/>
             </a:ext>
           </a:extLst>
         </p:spPr>
@@ -3346,8 +3346,20 @@
               </a:defRPr>
             </a:pPr>
             <a:r>
+              <a:rPr lang="en-US"/>
+              <a:t>Various </a:t>
+            </a:r>
+            <a:r>
+              <a:rPr lang="en-US" altLang="zh-CN"/>
+              <a:t>potential</a:t>
+            </a:r>
+            <a:r>
+              <a:rPr lang="en-US"/>
+              <a:t> </a:t>
+            </a:r>
+            <a:r>
               <a:rPr lang="en-US" dirty="0"/>
-              <a:t>Various optional tasks in the lab, including coding, engineering, experiments, and fieldwork.</a:t>
+              <a:t>tasks in the lab, including coding, engineering, experiments, and fieldwork.</a:t>
             </a:r>
           </a:p>
           <a:p>

</xml_diff>